<commit_message>
add animation for slide: in order delivery
</commit_message>
<xml_diff>
--- a/research_and_presentation/Transport Layer, TCP and Floods/presentation_slides/Transport Layer, TCP and Floods.pptx
+++ b/research_and_presentation/Transport Layer, TCP and Floods/presentation_slides/Transport Layer, TCP and Floods.pptx
@@ -245,7 +245,7 @@
           <a:p>
             <a:fld id="{4C493C19-E536-454C-AE32-E7C28372B87B}" type="datetimeFigureOut">
               <a:rPr lang="en-US" smtClean="0"/>
-              <a:t>11/23/2024</a:t>
+              <a:t>11/29/2024</a:t>
             </a:fld>
             <a:endParaRPr lang="en-US"/>
           </a:p>
@@ -15463,42 +15463,6 @@
       </p:sp>
       <p:sp>
         <p:nvSpPr>
-          <p:cNvPr id="98" name="Title 97">
-            <a:extLst>
-              <a:ext uri="{FF2B5EF4-FFF2-40B4-BE49-F238E27FC236}">
-                <a16:creationId xmlns:a16="http://schemas.microsoft.com/office/drawing/2014/main" id="{EEA1F55F-D002-5FA4-4E58-9737EE77399B}"/>
-              </a:ext>
-            </a:extLst>
-          </p:cNvPr>
-          <p:cNvSpPr>
-            <a:spLocks noGrp="1"/>
-          </p:cNvSpPr>
-          <p:nvPr>
-            <p:ph type="title" idx="4294967295"/>
-          </p:nvPr>
-        </p:nvSpPr>
-        <p:spPr>
-          <a:xfrm>
-            <a:off x="3926792" y="584590"/>
-            <a:ext cx="4421658" cy="1182033"/>
-          </a:xfrm>
-        </p:spPr>
-        <p:txBody>
-          <a:bodyPr>
-            <a:normAutofit/>
-          </a:bodyPr>
-          <a:lstStyle/>
-          <a:p>
-            <a:pPr algn="ctr"/>
-            <a:r>
-              <a:rPr lang="en-US" sz="4000" b="1" dirty="0"/>
-              <a:t>In Order Delivery</a:t>
-            </a:r>
-          </a:p>
-        </p:txBody>
-      </p:sp>
-      <p:sp>
-        <p:nvSpPr>
           <p:cNvPr id="6" name="Slide Number Placeholder 5">
             <a:extLst>
               <a:ext uri="{FF2B5EF4-FFF2-40B4-BE49-F238E27FC236}">
@@ -15583,6 +15547,150 @@
           </a:p>
         </p:txBody>
       </p:sp>
+      <p:sp>
+        <p:nvSpPr>
+          <p:cNvPr id="12" name="Rectangle 11">
+            <a:extLst>
+              <a:ext uri="{FF2B5EF4-FFF2-40B4-BE49-F238E27FC236}">
+                <a16:creationId xmlns:a16="http://schemas.microsoft.com/office/drawing/2014/main" id="{BA5B9305-A669-F2E1-E969-CBF32656C952}"/>
+              </a:ext>
+            </a:extLst>
+          </p:cNvPr>
+          <p:cNvSpPr/>
+          <p:nvPr/>
+        </p:nvSpPr>
+        <p:spPr>
+          <a:xfrm>
+            <a:off x="-126719" y="0"/>
+            <a:ext cx="6185730" cy="7025489"/>
+          </a:xfrm>
+          <a:prstGeom prst="rect">
+            <a:avLst/>
+          </a:prstGeom>
+          <a:solidFill>
+            <a:srgbClr val="FCEBA5"/>
+          </a:solidFill>
+          <a:ln>
+            <a:solidFill>
+              <a:srgbClr val="FCEBA5"/>
+            </a:solidFill>
+          </a:ln>
+        </p:spPr>
+        <p:style>
+          <a:lnRef idx="2">
+            <a:schemeClr val="accent1">
+              <a:shade val="15000"/>
+            </a:schemeClr>
+          </a:lnRef>
+          <a:fillRef idx="1">
+            <a:schemeClr val="accent1"/>
+          </a:fillRef>
+          <a:effectRef idx="0">
+            <a:schemeClr val="accent1"/>
+          </a:effectRef>
+          <a:fontRef idx="minor">
+            <a:schemeClr val="lt1"/>
+          </a:fontRef>
+        </p:style>
+        <p:txBody>
+          <a:bodyPr rtlCol="0" anchor="ctr"/>
+          <a:lstStyle/>
+          <a:p>
+            <a:pPr algn="ctr"/>
+            <a:endParaRPr lang="en-US"/>
+          </a:p>
+        </p:txBody>
+      </p:sp>
+      <p:sp>
+        <p:nvSpPr>
+          <p:cNvPr id="13" name="Rectangle 12">
+            <a:extLst>
+              <a:ext uri="{FF2B5EF4-FFF2-40B4-BE49-F238E27FC236}">
+                <a16:creationId xmlns:a16="http://schemas.microsoft.com/office/drawing/2014/main" id="{0C775C83-2884-1507-761E-FDE2C02D3151}"/>
+              </a:ext>
+            </a:extLst>
+          </p:cNvPr>
+          <p:cNvSpPr/>
+          <p:nvPr/>
+        </p:nvSpPr>
+        <p:spPr>
+          <a:xfrm>
+            <a:off x="6059011" y="0"/>
+            <a:ext cx="6487104" cy="7172036"/>
+          </a:xfrm>
+          <a:prstGeom prst="rect">
+            <a:avLst/>
+          </a:prstGeom>
+          <a:solidFill>
+            <a:srgbClr val="FBE37D"/>
+          </a:solidFill>
+          <a:ln>
+            <a:solidFill>
+              <a:srgbClr val="FBE37D"/>
+            </a:solidFill>
+          </a:ln>
+        </p:spPr>
+        <p:style>
+          <a:lnRef idx="2">
+            <a:schemeClr val="accent1">
+              <a:shade val="15000"/>
+            </a:schemeClr>
+          </a:lnRef>
+          <a:fillRef idx="1">
+            <a:schemeClr val="accent1"/>
+          </a:fillRef>
+          <a:effectRef idx="0">
+            <a:schemeClr val="accent1"/>
+          </a:effectRef>
+          <a:fontRef idx="minor">
+            <a:schemeClr val="lt1"/>
+          </a:fontRef>
+        </p:style>
+        <p:txBody>
+          <a:bodyPr rtlCol="0" anchor="ctr"/>
+          <a:lstStyle/>
+          <a:p>
+            <a:pPr algn="ctr"/>
+            <a:endParaRPr lang="en-US" dirty="0"/>
+          </a:p>
+        </p:txBody>
+      </p:sp>
+      <p:sp>
+        <p:nvSpPr>
+          <p:cNvPr id="98" name="Title 97">
+            <a:extLst>
+              <a:ext uri="{FF2B5EF4-FFF2-40B4-BE49-F238E27FC236}">
+                <a16:creationId xmlns:a16="http://schemas.microsoft.com/office/drawing/2014/main" id="{EEA1F55F-D002-5FA4-4E58-9737EE77399B}"/>
+              </a:ext>
+            </a:extLst>
+          </p:cNvPr>
+          <p:cNvSpPr>
+            <a:spLocks noGrp="1"/>
+          </p:cNvSpPr>
+          <p:nvPr>
+            <p:ph type="title" idx="4294967295"/>
+          </p:nvPr>
+        </p:nvSpPr>
+        <p:spPr>
+          <a:xfrm>
+            <a:off x="3926792" y="584590"/>
+            <a:ext cx="4421658" cy="1182033"/>
+          </a:xfrm>
+        </p:spPr>
+        <p:txBody>
+          <a:bodyPr>
+            <a:normAutofit/>
+          </a:bodyPr>
+          <a:lstStyle/>
+          <a:p>
+            <a:pPr algn="ctr"/>
+            <a:r>
+              <a:rPr lang="en-US" sz="4000" b="1" dirty="0"/>
+              <a:t>In Order Delivery</a:t>
+            </a:r>
+          </a:p>
+        </p:txBody>
+      </p:sp>
     </p:spTree>
     <p:extLst>
       <p:ext uri="{BB962C8B-B14F-4D97-AF65-F5344CB8AC3E}">
@@ -15593,6 +15701,146 @@
   <p:clrMapOvr>
     <a:masterClrMapping/>
   </p:clrMapOvr>
+  <p:timing>
+    <p:tnLst>
+      <p:par>
+        <p:cTn id="1" dur="indefinite" restart="never" nodeType="tmRoot">
+          <p:childTnLst>
+            <p:seq concurrent="1" nextAc="seek">
+              <p:cTn id="2" dur="indefinite" nodeType="mainSeq">
+                <p:childTnLst>
+                  <p:par>
+                    <p:cTn id="3" fill="hold">
+                      <p:stCondLst>
+                        <p:cond delay="indefinite"/>
+                      </p:stCondLst>
+                      <p:childTnLst>
+                        <p:par>
+                          <p:cTn id="4" fill="hold">
+                            <p:stCondLst>
+                              <p:cond delay="0"/>
+                            </p:stCondLst>
+                            <p:childTnLst>
+                              <p:par>
+                                <p:cTn id="5" presetID="22" presetClass="exit" presetSubtype="1" fill="hold" grpId="0" nodeType="clickEffect">
+                                  <p:stCondLst>
+                                    <p:cond delay="0"/>
+                                  </p:stCondLst>
+                                  <p:childTnLst>
+                                    <p:animEffect transition="out" filter="wipe(up)">
+                                      <p:cBhvr>
+                                        <p:cTn id="6" dur="500"/>
+                                        <p:tgtEl>
+                                          <p:spTgt spid="12"/>
+                                        </p:tgtEl>
+                                      </p:cBhvr>
+                                    </p:animEffect>
+                                    <p:set>
+                                      <p:cBhvr>
+                                        <p:cTn id="7" dur="1" fill="hold">
+                                          <p:stCondLst>
+                                            <p:cond delay="499"/>
+                                          </p:stCondLst>
+                                        </p:cTn>
+                                        <p:tgtEl>
+                                          <p:spTgt spid="12"/>
+                                        </p:tgtEl>
+                                        <p:attrNameLst>
+                                          <p:attrName>style.visibility</p:attrName>
+                                        </p:attrNameLst>
+                                      </p:cBhvr>
+                                      <p:to>
+                                        <p:strVal val="hidden"/>
+                                      </p:to>
+                                    </p:set>
+                                  </p:childTnLst>
+                                </p:cTn>
+                              </p:par>
+                            </p:childTnLst>
+                          </p:cTn>
+                        </p:par>
+                      </p:childTnLst>
+                    </p:cTn>
+                  </p:par>
+                  <p:par>
+                    <p:cTn id="8" fill="hold">
+                      <p:stCondLst>
+                        <p:cond delay="indefinite"/>
+                      </p:stCondLst>
+                      <p:childTnLst>
+                        <p:par>
+                          <p:cTn id="9" fill="hold">
+                            <p:stCondLst>
+                              <p:cond delay="0"/>
+                            </p:stCondLst>
+                            <p:childTnLst>
+                              <p:par>
+                                <p:cTn id="10" presetID="22" presetClass="exit" presetSubtype="1" fill="hold" grpId="0" nodeType="clickEffect">
+                                  <p:stCondLst>
+                                    <p:cond delay="0"/>
+                                  </p:stCondLst>
+                                  <p:childTnLst>
+                                    <p:animEffect transition="out" filter="wipe(up)">
+                                      <p:cBhvr>
+                                        <p:cTn id="11" dur="500"/>
+                                        <p:tgtEl>
+                                          <p:spTgt spid="13"/>
+                                        </p:tgtEl>
+                                      </p:cBhvr>
+                                    </p:animEffect>
+                                    <p:set>
+                                      <p:cBhvr>
+                                        <p:cTn id="12" dur="1" fill="hold">
+                                          <p:stCondLst>
+                                            <p:cond delay="499"/>
+                                          </p:stCondLst>
+                                        </p:cTn>
+                                        <p:tgtEl>
+                                          <p:spTgt spid="13"/>
+                                        </p:tgtEl>
+                                        <p:attrNameLst>
+                                          <p:attrName>style.visibility</p:attrName>
+                                        </p:attrNameLst>
+                                      </p:cBhvr>
+                                      <p:to>
+                                        <p:strVal val="hidden"/>
+                                      </p:to>
+                                    </p:set>
+                                  </p:childTnLst>
+                                </p:cTn>
+                              </p:par>
+                            </p:childTnLst>
+                          </p:cTn>
+                        </p:par>
+                      </p:childTnLst>
+                    </p:cTn>
+                  </p:par>
+                </p:childTnLst>
+              </p:cTn>
+              <p:prevCondLst>
+                <p:cond evt="onPrev" delay="0">
+                  <p:tgtEl>
+                    <p:sldTgt/>
+                  </p:tgtEl>
+                </p:cond>
+              </p:prevCondLst>
+              <p:nextCondLst>
+                <p:cond evt="onNext" delay="0">
+                  <p:tgtEl>
+                    <p:sldTgt/>
+                  </p:tgtEl>
+                </p:cond>
+              </p:nextCondLst>
+            </p:seq>
+          </p:childTnLst>
+        </p:cTn>
+      </p:par>
+    </p:tnLst>
+    <p:bldLst>
+      <p:bldP spid="12" grpId="0" animBg="1"/>
+      <p:bldP spid="13" grpId="0" animBg="1"/>
+    </p:bldLst>
+  </p:timing>
 </p:sld>
 </file>
 

</xml_diff>